<commit_message>
fixed misc typos on web site
</commit_message>
<xml_diff>
--- a/Slides/Lesson 0.2 How to Learn in This Course.pptx
+++ b/Slides/Lesson 0.2 How to Learn in This Course.pptx
@@ -224,7 +224,7 @@
           <a:p>
             <a:fld id="{FF5194DA-5B46-4C21-B973-C13D42985E34}" type="datetimeFigureOut">
               <a:rPr lang="en-US" smtClean="0"/>
-              <a:t>8/1/2015</a:t>
+              <a:t>9/3/2015</a:t>
             </a:fld>
             <a:endParaRPr lang="en-US"/>
           </a:p>
@@ -801,7 +801,7 @@
                   </a:prstClr>
                 </a:solidFill>
               </a:rPr>
-              <a:t>8/1/2015</a:t>
+              <a:t>9/3/2015</a:t>
             </a:fld>
             <a:endParaRPr lang="en-US">
               <a:solidFill>
@@ -1092,7 +1092,7 @@
                   </a:prstClr>
                 </a:solidFill>
               </a:rPr>
-              <a:t>8/1/2015</a:t>
+              <a:t>9/3/2015</a:t>
             </a:fld>
             <a:endParaRPr lang="en-US">
               <a:solidFill>
@@ -1293,7 +1293,7 @@
                   </a:prstClr>
                 </a:solidFill>
               </a:rPr>
-              <a:t>8/1/2015</a:t>
+              <a:t>9/3/2015</a:t>
             </a:fld>
             <a:endParaRPr lang="en-US">
               <a:solidFill>
@@ -1504,7 +1504,7 @@
                   </a:prstClr>
                 </a:solidFill>
               </a:rPr>
-              <a:t>8/1/2015</a:t>
+              <a:t>9/3/2015</a:t>
             </a:fld>
             <a:endParaRPr lang="en-US">
               <a:solidFill>
@@ -1711,7 +1711,7 @@
                   </a:prstClr>
                 </a:solidFill>
               </a:rPr>
-              <a:t>8/1/2015</a:t>
+              <a:t>9/3/2015</a:t>
             </a:fld>
             <a:endParaRPr lang="en-US" dirty="0">
               <a:solidFill>
@@ -1867,7 +1867,7 @@
                   </a:prstClr>
                 </a:solidFill>
               </a:rPr>
-              <a:t>8/1/2015</a:t>
+              <a:t>9/3/2015</a:t>
             </a:fld>
             <a:endParaRPr lang="en-US">
               <a:solidFill>
@@ -2144,7 +2144,7 @@
                   </a:prstClr>
                 </a:solidFill>
               </a:rPr>
-              <a:t>8/1/2015</a:t>
+              <a:t>9/3/2015</a:t>
             </a:fld>
             <a:endParaRPr lang="en-US">
               <a:solidFill>
@@ -2463,7 +2463,7 @@
                   </a:prstClr>
                 </a:solidFill>
               </a:rPr>
-              <a:t>8/1/2015</a:t>
+              <a:t>9/3/2015</a:t>
             </a:fld>
             <a:endParaRPr lang="en-US">
               <a:solidFill>
@@ -2916,7 +2916,7 @@
                   </a:prstClr>
                 </a:solidFill>
               </a:rPr>
-              <a:t>8/1/2015</a:t>
+              <a:t>9/3/2015</a:t>
             </a:fld>
             <a:endParaRPr lang="en-US">
               <a:solidFill>
@@ -3065,7 +3065,7 @@
                   </a:prstClr>
                 </a:solidFill>
               </a:rPr>
-              <a:t>8/1/2015</a:t>
+              <a:t>9/3/2015</a:t>
             </a:fld>
             <a:endParaRPr lang="en-US">
               <a:solidFill>
@@ -3191,7 +3191,7 @@
                   </a:prstClr>
                 </a:solidFill>
               </a:rPr>
-              <a:t>8/1/2015</a:t>
+              <a:t>9/3/2015</a:t>
             </a:fld>
             <a:endParaRPr lang="en-US">
               <a:solidFill>
@@ -3499,7 +3499,7 @@
                   </a:prstClr>
                 </a:solidFill>
               </a:rPr>
-              <a:t>8/1/2015</a:t>
+              <a:t>9/3/2015</a:t>
             </a:fld>
             <a:endParaRPr lang="en-US">
               <a:solidFill>
@@ -3743,7 +3743,7 @@
                   </a:prstClr>
                 </a:solidFill>
               </a:rPr>
-              <a:t>8/1/2015</a:t>
+              <a:t>9/3/2015</a:t>
             </a:fld>
             <a:endParaRPr lang="en-US">
               <a:solidFill>
@@ -4738,15 +4738,23 @@
           <a:p>
             <a:r>
               <a:rPr lang="en-US" dirty="0" smtClean="0"/>
-              <a:t>The course web site contains detailed instructions on what you must turn in and how you must do it.  Go study it.</a:t>
-            </a:r>
-          </a:p>
-          <a:p>
-            <a:r>
-              <a:rPr lang="en-US" dirty="0" smtClean="0"/>
-              <a:t>Your submission package must include a lab notebook in which you record the time you spent on the problem.  See the website for details.</a:t>
-            </a:r>
-            <a:endParaRPr lang="en-US" dirty="0"/>
+              <a:t>The course web site contains detailed instructions on what you must turn in and how you must do it.  Go study it</a:t>
+            </a:r>
+            <a:r>
+              <a:rPr lang="en-US" dirty="0" smtClean="0"/>
+              <a:t>.</a:t>
+            </a:r>
+          </a:p>
+          <a:p>
+            <a:r>
+              <a:rPr lang="en-US" dirty="0" smtClean="0"/>
+              <a:t>The requirement for a lab notebook has been replaced by a Work Session Report, which is a simple Google form that you will complete at the end of each </a:t>
+            </a:r>
+            <a:r>
+              <a:rPr lang="en-US" smtClean="0"/>
+              <a:t>work session.</a:t>
+            </a:r>
+            <a:endParaRPr lang="en-US" dirty="0" smtClean="0"/>
           </a:p>
         </p:txBody>
       </p:sp>

</xml_diff>